<commit_message>
Changes to notebook, readme, and presentation
</commit_message>
<xml_diff>
--- a/PRESENTATION.pptx
+++ b/PRESENTATION.pptx
@@ -271,7 +271,7 @@
           <a:p>
             <a:fld id="{1D8BD707-D9CF-40AE-B4C6-C98DA3205C09}" type="datetimeFigureOut">
               <a:rPr lang="en-US"/>
-              <a:t>6/1/2023</a:t>
+              <a:t>6/2/2023</a:t>
             </a:fld>
             <a:endParaRPr lang="en-US"/>
           </a:p>
@@ -448,7 +448,7 @@
           <a:p>
             <a:fld id="{1D8BD707-D9CF-40AE-B4C6-C98DA3205C09}" type="datetimeFigureOut">
               <a:rPr lang="en-US"/>
-              <a:t>6/1/2023</a:t>
+              <a:t>6/2/2023</a:t>
             </a:fld>
             <a:endParaRPr lang="en-US"/>
           </a:p>
@@ -662,7 +662,7 @@
           <a:p>
             <a:fld id="{1D8BD707-D9CF-40AE-B4C6-C98DA3205C09}" type="datetimeFigureOut">
               <a:rPr lang="en-US"/>
-              <a:t>6/1/2023</a:t>
+              <a:t>6/2/2023</a:t>
             </a:fld>
             <a:endParaRPr lang="en-US"/>
           </a:p>
@@ -810,7 +810,7 @@
           <a:p>
             <a:fld id="{1D8BD707-D9CF-40AE-B4C6-C98DA3205C09}" type="datetimeFigureOut">
               <a:rPr lang="en-US"/>
-              <a:t>6/1/2023</a:t>
+              <a:t>6/2/2023</a:t>
             </a:fld>
             <a:endParaRPr lang="en-US"/>
           </a:p>
@@ -987,7 +987,7 @@
           <a:p>
             <a:fld id="{1D8BD707-D9CF-40AE-B4C6-C98DA3205C09}" type="datetimeFigureOut">
               <a:rPr lang="en-US"/>
-              <a:t>6/1/2023</a:t>
+              <a:t>6/2/2023</a:t>
             </a:fld>
             <a:endParaRPr lang="en-US"/>
           </a:p>
@@ -1212,7 +1212,7 @@
           <a:p>
             <a:fld id="{1D8BD707-D9CF-40AE-B4C6-C98DA3205C09}" type="datetimeFigureOut">
               <a:rPr lang="en-US"/>
-              <a:t>6/1/2023</a:t>
+              <a:t>6/2/2023</a:t>
             </a:fld>
             <a:endParaRPr lang="en-US"/>
           </a:p>
@@ -2695,10 +2695,10 @@
       </p:sp>
       <p:pic>
         <p:nvPicPr>
-          <p:cNvPr id="9" name="Picture 8">
+          <p:cNvPr id="3" name="Picture 2">
             <a:extLst>
               <a:ext uri="{FF2B5EF4-FFF2-40B4-BE49-F238E27FC236}">
-                <a16:creationId xmlns:a16="http://schemas.microsoft.com/office/drawing/2014/main" id="{E67DBBBB-4087-CADE-69D0-0A9D52AD95B8}"/>
+                <a16:creationId xmlns:a16="http://schemas.microsoft.com/office/drawing/2014/main" id="{EA13F19D-B241-FB5A-1442-EBC378CE962A}"/>
               </a:ext>
             </a:extLst>
           </p:cNvPr>
@@ -2715,8 +2715,8 @@
         </p:blipFill>
         <p:spPr>
           <a:xfrm>
-            <a:off x="838200" y="1742542"/>
-            <a:ext cx="8407113" cy="6448958"/>
+            <a:off x="224790" y="1866900"/>
+            <a:ext cx="9156700" cy="7848600"/>
           </a:xfrm>
           <a:prstGeom prst="rect">
             <a:avLst/>
@@ -3162,7 +3162,7 @@
         <p:spPr>
           <a:xfrm>
             <a:off x="1413128" y="2884528"/>
-            <a:ext cx="6265545" cy="5294398"/>
+            <a:ext cx="6265545" cy="6664004"/>
           </a:xfrm>
           <a:prstGeom prst="rect">
             <a:avLst/>
@@ -3358,6 +3358,28 @@
                 <a:cs typeface="Tahoma"/>
               </a:rPr>
               <a:t>P Value &lt; 0.05 means that the model is statistically significant.</a:t>
+            </a:r>
+          </a:p>
+          <a:p>
+            <a:pPr marL="342900" marR="5080" indent="-342900">
+              <a:lnSpc>
+                <a:spcPct val="100000"/>
+              </a:lnSpc>
+              <a:spcBef>
+                <a:spcPts val="605"/>
+              </a:spcBef>
+              <a:buFont typeface="Arial" panose="020B0604020202020204" pitchFamily="34" charset="0"/>
+              <a:buChar char="•"/>
+            </a:pPr>
+            <a:r>
+              <a:rPr lang="en-US" sz="2800" b="0" i="0" dirty="0">
+                <a:solidFill>
+                  <a:srgbClr val="202124"/>
+                </a:solidFill>
+                <a:effectLst/>
+                <a:latin typeface="Roboto" panose="02000000000000000000" pitchFamily="2" charset="0"/>
+              </a:rPr>
+              <a:t>Our final model3 when compared to the baseline model, the R-squared increase from 50% to 54%</a:t>
             </a:r>
             <a:endParaRPr lang="en-US" sz="2450" b="1" spc="70" dirty="0">
               <a:latin typeface="Tahoma"/>
@@ -3623,8 +3645,8 @@
         </p:nvSpPr>
         <p:spPr>
           <a:xfrm>
-            <a:off x="5901673" y="2481371"/>
-            <a:ext cx="6475095" cy="843821"/>
+            <a:off x="2545080" y="1536752"/>
+            <a:ext cx="9328768" cy="1243930"/>
           </a:xfrm>
           <a:prstGeom prst="rect">
             <a:avLst/>
@@ -3636,7 +3658,7 @@
           </a:bodyPr>
           <a:lstStyle/>
           <a:p>
-            <a:pPr marL="12700">
+            <a:pPr marL="12700" algn="ctr">
               <a:lnSpc>
                 <a:spcPct val="100000"/>
               </a:lnSpc>
@@ -3645,7 +3667,7 @@
               </a:spcBef>
             </a:pPr>
             <a:r>
-              <a:rPr lang="en-US" sz="5400" spc="120" dirty="0">
+              <a:rPr lang="en-US" sz="8000" spc="120" dirty="0">
                 <a:solidFill>
                   <a:srgbClr val="000000"/>
                 </a:solidFill>
@@ -3654,7 +3676,7 @@
               </a:rPr>
               <a:t>Recommendations</a:t>
             </a:r>
-            <a:endParaRPr lang="en-US" sz="5400" dirty="0">
+            <a:endParaRPr lang="en-US" sz="8000" dirty="0">
               <a:latin typeface="Cambria"/>
               <a:cs typeface="Cambria"/>
             </a:endParaRPr>
@@ -3673,7 +3695,7 @@
         </p:nvSpPr>
         <p:spPr>
           <a:xfrm>
-            <a:off x="2514600" y="3771900"/>
+            <a:off x="2545080" y="3037082"/>
             <a:ext cx="11311998" cy="4469237"/>
           </a:xfrm>
           <a:prstGeom prst="rect">
@@ -3983,7 +4005,7 @@
         </p:nvSpPr>
         <p:spPr>
           <a:xfrm>
-            <a:off x="5768073" y="1866900"/>
+            <a:off x="2382837" y="1810774"/>
             <a:ext cx="6475095" cy="1243930"/>
           </a:xfrm>
           <a:prstGeom prst="rect">

</xml_diff>